<commit_message>
Updates to chapter 4a and 4b labmanual and projects. First checkin of u8g_lib
</commit_message>
<xml_diff>
--- a/labmanual/Drawings/bleintro.pptx
+++ b/labmanual/Drawings/bleintro.pptx
@@ -200,7 +200,7 @@
           <a:p>
             <a:fld id="{5C78E9C7-9CA3-A64A-B46C-6E620848F682}" type="datetimeFigureOut">
               <a:rPr lang="en-US" smtClean="0"/>
-              <a:t>6/4/2018</a:t>
+              <a:t>6/5/2018</a:t>
             </a:fld>
             <a:endParaRPr lang="en-US"/>
           </a:p>
@@ -598,7 +598,7 @@
           <a:p>
             <a:fld id="{FB5F2AB9-D88E-BD44-B295-056A7213B648}" type="datetimeFigureOut">
               <a:rPr lang="en-US" smtClean="0"/>
-              <a:t>6/4/2018</a:t>
+              <a:t>6/5/2018</a:t>
             </a:fld>
             <a:endParaRPr lang="en-US"/>
           </a:p>
@@ -763,7 +763,7 @@
           <a:p>
             <a:fld id="{FB5F2AB9-D88E-BD44-B295-056A7213B648}" type="datetimeFigureOut">
               <a:rPr lang="en-US" smtClean="0"/>
-              <a:t>6/4/2018</a:t>
+              <a:t>6/5/2018</a:t>
             </a:fld>
             <a:endParaRPr lang="en-US"/>
           </a:p>
@@ -938,7 +938,7 @@
           <a:p>
             <a:fld id="{FB5F2AB9-D88E-BD44-B295-056A7213B648}" type="datetimeFigureOut">
               <a:rPr lang="en-US" smtClean="0"/>
-              <a:t>6/4/2018</a:t>
+              <a:t>6/5/2018</a:t>
             </a:fld>
             <a:endParaRPr lang="en-US"/>
           </a:p>
@@ -1103,7 +1103,7 @@
           <a:p>
             <a:fld id="{FB5F2AB9-D88E-BD44-B295-056A7213B648}" type="datetimeFigureOut">
               <a:rPr lang="en-US" smtClean="0"/>
-              <a:t>6/4/2018</a:t>
+              <a:t>6/5/2018</a:t>
             </a:fld>
             <a:endParaRPr lang="en-US"/>
           </a:p>
@@ -1342,7 +1342,7 @@
           <a:p>
             <a:fld id="{FB5F2AB9-D88E-BD44-B295-056A7213B648}" type="datetimeFigureOut">
               <a:rPr lang="en-US" smtClean="0"/>
-              <a:t>6/4/2018</a:t>
+              <a:t>6/5/2018</a:t>
             </a:fld>
             <a:endParaRPr lang="en-US"/>
           </a:p>
@@ -1569,7 +1569,7 @@
           <a:p>
             <a:fld id="{FB5F2AB9-D88E-BD44-B295-056A7213B648}" type="datetimeFigureOut">
               <a:rPr lang="en-US" smtClean="0"/>
-              <a:t>6/4/2018</a:t>
+              <a:t>6/5/2018</a:t>
             </a:fld>
             <a:endParaRPr lang="en-US"/>
           </a:p>
@@ -1931,7 +1931,7 @@
           <a:p>
             <a:fld id="{FB5F2AB9-D88E-BD44-B295-056A7213B648}" type="datetimeFigureOut">
               <a:rPr lang="en-US" smtClean="0"/>
-              <a:t>6/4/2018</a:t>
+              <a:t>6/5/2018</a:t>
             </a:fld>
             <a:endParaRPr lang="en-US"/>
           </a:p>
@@ -2044,7 +2044,7 @@
           <a:p>
             <a:fld id="{FB5F2AB9-D88E-BD44-B295-056A7213B648}" type="datetimeFigureOut">
               <a:rPr lang="en-US" smtClean="0"/>
-              <a:t>6/4/2018</a:t>
+              <a:t>6/5/2018</a:t>
             </a:fld>
             <a:endParaRPr lang="en-US"/>
           </a:p>
@@ -2134,7 +2134,7 @@
           <a:p>
             <a:fld id="{FB5F2AB9-D88E-BD44-B295-056A7213B648}" type="datetimeFigureOut">
               <a:rPr lang="en-US" smtClean="0"/>
-              <a:t>6/4/2018</a:t>
+              <a:t>6/5/2018</a:t>
             </a:fld>
             <a:endParaRPr lang="en-US"/>
           </a:p>
@@ -2406,7 +2406,7 @@
           <a:p>
             <a:fld id="{FB5F2AB9-D88E-BD44-B295-056A7213B648}" type="datetimeFigureOut">
               <a:rPr lang="en-US" smtClean="0"/>
-              <a:t>6/4/2018</a:t>
+              <a:t>6/5/2018</a:t>
             </a:fld>
             <a:endParaRPr lang="en-US"/>
           </a:p>
@@ -2658,7 +2658,7 @@
           <a:p>
             <a:fld id="{FB5F2AB9-D88E-BD44-B295-056A7213B648}" type="datetimeFigureOut">
               <a:rPr lang="en-US" smtClean="0"/>
-              <a:t>6/4/2018</a:t>
+              <a:t>6/5/2018</a:t>
             </a:fld>
             <a:endParaRPr lang="en-US"/>
           </a:p>
@@ -2866,7 +2866,7 @@
           <a:p>
             <a:fld id="{FB5F2AB9-D88E-BD44-B295-056A7213B648}" type="datetimeFigureOut">
               <a:rPr lang="en-US" smtClean="0"/>
-              <a:t>6/4/2018</a:t>
+              <a:t>6/5/2018</a:t>
             </a:fld>
             <a:endParaRPr lang="en-US"/>
           </a:p>
@@ -12299,6 +12299,52 @@
           </a:p>
         </p:txBody>
       </p:sp>
+      <p:sp>
+        <p:nvSpPr>
+          <p:cNvPr id="3" name="Arrow: Left-Right 2">
+            <a:extLst>
+              <a:ext uri="{FF2B5EF4-FFF2-40B4-BE49-F238E27FC236}">
+                <a16:creationId xmlns:a16="http://schemas.microsoft.com/office/drawing/2014/main" id="{009ED4C6-1977-48D3-AD93-9DE4D0021D63}"/>
+              </a:ext>
+            </a:extLst>
+          </p:cNvPr>
+          <p:cNvSpPr/>
+          <p:nvPr/>
+        </p:nvSpPr>
+        <p:spPr>
+          <a:xfrm>
+            <a:off x="3119738" y="4655650"/>
+            <a:ext cx="668438" cy="242146"/>
+          </a:xfrm>
+          <a:prstGeom prst="leftRightArrow">
+            <a:avLst/>
+          </a:prstGeom>
+        </p:spPr>
+        <p:style>
+          <a:lnRef idx="2">
+            <a:schemeClr val="accent1">
+              <a:shade val="50000"/>
+            </a:schemeClr>
+          </a:lnRef>
+          <a:fillRef idx="1">
+            <a:schemeClr val="accent1"/>
+          </a:fillRef>
+          <a:effectRef idx="0">
+            <a:schemeClr val="accent1"/>
+          </a:effectRef>
+          <a:fontRef idx="minor">
+            <a:schemeClr val="lt1"/>
+          </a:fontRef>
+        </p:style>
+        <p:txBody>
+          <a:bodyPr rtlCol="0" anchor="ctr"/>
+          <a:lstStyle/>
+          <a:p>
+            <a:pPr algn="ctr"/>
+            <a:endParaRPr lang="en-US"/>
+          </a:p>
+        </p:txBody>
+      </p:sp>
     </p:spTree>
     <p:extLst>
       <p:ext uri="{BB962C8B-B14F-4D97-AF65-F5344CB8AC3E}">

</xml_diff>

<commit_message>
Major updates to manual and examples after meetings in MD. Final version for class to be held WW1838 in KY.
</commit_message>
<xml_diff>
--- a/labmanual/Drawings/bleintro.pptx
+++ b/labmanual/Drawings/bleintro.pptx
@@ -200,7 +200,7 @@
           <a:p>
             <a:fld id="{5C78E9C7-9CA3-A64A-B46C-6E620848F682}" type="datetimeFigureOut">
               <a:rPr lang="en-US" smtClean="0"/>
-              <a:t>6/18/2018</a:t>
+              <a:t>9/8/2018</a:t>
             </a:fld>
             <a:endParaRPr lang="en-US"/>
           </a:p>
@@ -598,7 +598,7 @@
           <a:p>
             <a:fld id="{FB5F2AB9-D88E-BD44-B295-056A7213B648}" type="datetimeFigureOut">
               <a:rPr lang="en-US" smtClean="0"/>
-              <a:t>6/18/2018</a:t>
+              <a:t>9/8/2018</a:t>
             </a:fld>
             <a:endParaRPr lang="en-US"/>
           </a:p>
@@ -763,7 +763,7 @@
           <a:p>
             <a:fld id="{FB5F2AB9-D88E-BD44-B295-056A7213B648}" type="datetimeFigureOut">
               <a:rPr lang="en-US" smtClean="0"/>
-              <a:t>6/18/2018</a:t>
+              <a:t>9/8/2018</a:t>
             </a:fld>
             <a:endParaRPr lang="en-US"/>
           </a:p>
@@ -938,7 +938,7 @@
           <a:p>
             <a:fld id="{FB5F2AB9-D88E-BD44-B295-056A7213B648}" type="datetimeFigureOut">
               <a:rPr lang="en-US" smtClean="0"/>
-              <a:t>6/18/2018</a:t>
+              <a:t>9/8/2018</a:t>
             </a:fld>
             <a:endParaRPr lang="en-US"/>
           </a:p>
@@ -1103,7 +1103,7 @@
           <a:p>
             <a:fld id="{FB5F2AB9-D88E-BD44-B295-056A7213B648}" type="datetimeFigureOut">
               <a:rPr lang="en-US" smtClean="0"/>
-              <a:t>6/18/2018</a:t>
+              <a:t>9/8/2018</a:t>
             </a:fld>
             <a:endParaRPr lang="en-US"/>
           </a:p>
@@ -1342,7 +1342,7 @@
           <a:p>
             <a:fld id="{FB5F2AB9-D88E-BD44-B295-056A7213B648}" type="datetimeFigureOut">
               <a:rPr lang="en-US" smtClean="0"/>
-              <a:t>6/18/2018</a:t>
+              <a:t>9/8/2018</a:t>
             </a:fld>
             <a:endParaRPr lang="en-US"/>
           </a:p>
@@ -1569,7 +1569,7 @@
           <a:p>
             <a:fld id="{FB5F2AB9-D88E-BD44-B295-056A7213B648}" type="datetimeFigureOut">
               <a:rPr lang="en-US" smtClean="0"/>
-              <a:t>6/18/2018</a:t>
+              <a:t>9/8/2018</a:t>
             </a:fld>
             <a:endParaRPr lang="en-US"/>
           </a:p>
@@ -1931,7 +1931,7 @@
           <a:p>
             <a:fld id="{FB5F2AB9-D88E-BD44-B295-056A7213B648}" type="datetimeFigureOut">
               <a:rPr lang="en-US" smtClean="0"/>
-              <a:t>6/18/2018</a:t>
+              <a:t>9/8/2018</a:t>
             </a:fld>
             <a:endParaRPr lang="en-US"/>
           </a:p>
@@ -2044,7 +2044,7 @@
           <a:p>
             <a:fld id="{FB5F2AB9-D88E-BD44-B295-056A7213B648}" type="datetimeFigureOut">
               <a:rPr lang="en-US" smtClean="0"/>
-              <a:t>6/18/2018</a:t>
+              <a:t>9/8/2018</a:t>
             </a:fld>
             <a:endParaRPr lang="en-US"/>
           </a:p>
@@ -2134,7 +2134,7 @@
           <a:p>
             <a:fld id="{FB5F2AB9-D88E-BD44-B295-056A7213B648}" type="datetimeFigureOut">
               <a:rPr lang="en-US" smtClean="0"/>
-              <a:t>6/18/2018</a:t>
+              <a:t>9/8/2018</a:t>
             </a:fld>
             <a:endParaRPr lang="en-US"/>
           </a:p>
@@ -2406,7 +2406,7 @@
           <a:p>
             <a:fld id="{FB5F2AB9-D88E-BD44-B295-056A7213B648}" type="datetimeFigureOut">
               <a:rPr lang="en-US" smtClean="0"/>
-              <a:t>6/18/2018</a:t>
+              <a:t>9/8/2018</a:t>
             </a:fld>
             <a:endParaRPr lang="en-US"/>
           </a:p>
@@ -2657,7 +2657,7 @@
           <a:p>
             <a:fld id="{FB5F2AB9-D88E-BD44-B295-056A7213B648}" type="datetimeFigureOut">
               <a:rPr lang="en-US" smtClean="0"/>
-              <a:t>6/18/2018</a:t>
+              <a:t>9/8/2018</a:t>
             </a:fld>
             <a:endParaRPr lang="en-US"/>
           </a:p>
@@ -2865,7 +2865,7 @@
           <a:p>
             <a:fld id="{FB5F2AB9-D88E-BD44-B295-056A7213B648}" type="datetimeFigureOut">
               <a:rPr lang="en-US" smtClean="0"/>
-              <a:t>6/18/2018</a:t>
+              <a:t>9/8/2018</a:t>
             </a:fld>
             <a:endParaRPr lang="en-US"/>
           </a:p>
@@ -4138,8 +4138,8 @@
           </p:nvSpPr>
           <p:spPr>
             <a:xfrm>
-              <a:off x="966231" y="1346762"/>
-              <a:ext cx="1797519" cy="369332"/>
+              <a:off x="966231" y="1470587"/>
+              <a:ext cx="1797519" cy="241885"/>
             </a:xfrm>
             <a:prstGeom prst="rect">
               <a:avLst/>
@@ -4155,25 +4155,12 @@
             <a:lstStyle/>
             <a:p>
               <a:r>
-                <a:rPr lang="en-US" sz="800" err="1"/>
-                <a:t>wiced_transport_init</a:t>
+                <a:rPr lang="en-US" sz="800"/>
+                <a:t>wiced</a:t>
               </a:r>
-              <a:endParaRPr lang="en-US" sz="800"/>
-            </a:p>
-            <a:p>
               <a:r>
                 <a:rPr lang="en-US" sz="800" err="1"/>
-                <a:t>wiced_transport_create_buffer_pool</a:t>
-              </a:r>
-              <a:r>
-                <a:rPr lang="en-US" sz="800"/>
-                <a:t> </a:t>
-              </a:r>
-            </a:p>
-            <a:p>
-              <a:r>
-                <a:rPr lang="en-US" sz="800" err="1"/>
-                <a:t>wiced_bt_stack_init</a:t>
+                <a:t>_bt_stack_init</a:t>
               </a:r>
               <a:endParaRPr lang="en-US" sz="800"/>
             </a:p>
@@ -6940,17 +6927,12 @@
               </a:bodyPr>
               <a:lstStyle/>
               <a:p>
-                <a:r>
-                  <a:rPr lang="en-US" sz="800" err="1">
-                    <a:sym typeface="Wingdings"/>
-                  </a:rPr>
-                  <a:t>Adv</a:t>
-                </a:r>
+                <a:pPr algn="ctr"/>
                 <a:r>
                   <a:rPr lang="en-US" sz="800">
                     <a:sym typeface="Wingdings"/>
                   </a:rPr>
-                  <a:t> Packet</a:t>
+                  <a:t>ADV</a:t>
                 </a:r>
               </a:p>
               <a:p>
@@ -7810,8 +7792,8 @@
           </p:nvSpPr>
           <p:spPr>
             <a:xfrm>
-              <a:off x="966231" y="1346762"/>
-              <a:ext cx="1797519" cy="369332"/>
+              <a:off x="958689" y="1460933"/>
+              <a:ext cx="1797519" cy="195688"/>
             </a:xfrm>
             <a:prstGeom prst="rect">
               <a:avLst/>
@@ -7827,25 +7809,12 @@
             <a:lstStyle/>
             <a:p>
               <a:r>
-                <a:rPr lang="en-US" sz="800" err="1"/>
-                <a:t>wiced_transport_init</a:t>
+                <a:rPr lang="en-US" sz="800"/>
+                <a:t>wiced</a:t>
               </a:r>
-              <a:endParaRPr lang="en-US" sz="800"/>
-            </a:p>
-            <a:p>
               <a:r>
                 <a:rPr lang="en-US" sz="800" err="1"/>
-                <a:t>wiced_transport_create_buffer_pool</a:t>
-              </a:r>
-              <a:r>
-                <a:rPr lang="en-US" sz="800"/>
-                <a:t> </a:t>
-              </a:r>
-            </a:p>
-            <a:p>
-              <a:r>
-                <a:rPr lang="en-US" sz="800" err="1"/>
-                <a:t>wiced_bt_stack_init</a:t>
+                <a:t>_bt_stack_init</a:t>
               </a:r>
               <a:endParaRPr lang="en-US" sz="800"/>
             </a:p>
@@ -9388,6 +9357,7 @@
           <p:nvCxnSpPr>
             <p:cNvPr id="107" name="Straight Arrow Connector 106"/>
             <p:cNvCxnSpPr>
+              <a:cxnSpLocks/>
               <a:endCxn id="75" idx="0"/>
             </p:cNvCxnSpPr>
             <p:nvPr/>
@@ -9791,17 +9761,12 @@
               </a:bodyPr>
               <a:lstStyle/>
               <a:p>
-                <a:r>
-                  <a:rPr lang="en-US" sz="800" err="1">
-                    <a:sym typeface="Wingdings"/>
-                  </a:rPr>
-                  <a:t>Adv</a:t>
-                </a:r>
+                <a:pPr algn="ctr"/>
                 <a:r>
                   <a:rPr lang="en-US" sz="800">
                     <a:sym typeface="Wingdings"/>
                   </a:rPr>
-                  <a:t> Packet</a:t>
+                  <a:t>ADV</a:t>
                 </a:r>
               </a:p>
               <a:p>
@@ -10419,10 +10384,10 @@
           </p:nvGrpSpPr>
           <p:grpSpPr>
             <a:xfrm>
-              <a:off x="2412627" y="4009565"/>
-              <a:ext cx="3239371" cy="183226"/>
-              <a:chOff x="2412627" y="4790401"/>
-              <a:chExt cx="3239371" cy="183226"/>
+              <a:off x="2412627" y="4021463"/>
+              <a:ext cx="3239371" cy="209428"/>
+              <a:chOff x="2412627" y="4802299"/>
+              <a:chExt cx="3239371" cy="209428"/>
             </a:xfrm>
           </p:grpSpPr>
           <p:sp>
@@ -10433,8 +10398,8 @@
             </p:nvSpPr>
             <p:spPr>
               <a:xfrm>
-                <a:off x="3086592" y="4790401"/>
-                <a:ext cx="807659" cy="183226"/>
+                <a:off x="3086592" y="4802299"/>
+                <a:ext cx="751061" cy="209428"/>
               </a:xfrm>
               <a:prstGeom prst="rect">
                 <a:avLst/>
@@ -10449,9 +10414,10 @@
               </a:bodyPr>
               <a:lstStyle/>
               <a:p>
+                <a:pPr algn="ctr"/>
                 <a:r>
                   <a:rPr lang="en-US" sz="800"/>
-                  <a:t>CONNECT_REQ</a:t>
+                  <a:t>CONN_REQ</a:t>
                 </a:r>
               </a:p>
             </p:txBody>
@@ -10507,120 +10473,6 @@
               <a:ln>
                 <a:headEnd type="triangle" w="sm" len="sm"/>
                 <a:tailEnd type="none" w="sm" len="sm"/>
-              </a:ln>
-            </p:spPr>
-            <p:style>
-              <a:lnRef idx="1">
-                <a:schemeClr val="accent1"/>
-              </a:lnRef>
-              <a:fillRef idx="0">
-                <a:schemeClr val="accent1"/>
-              </a:fillRef>
-              <a:effectRef idx="0">
-                <a:schemeClr val="accent1"/>
-              </a:effectRef>
-              <a:fontRef idx="minor">
-                <a:schemeClr val="tx1"/>
-              </a:fontRef>
-            </p:style>
-          </p:cxnSp>
-        </p:grpSp>
-        <p:grpSp>
-          <p:nvGrpSpPr>
-            <p:cNvPr id="140" name="Group 139"/>
-            <p:cNvGrpSpPr/>
-            <p:nvPr/>
-          </p:nvGrpSpPr>
-          <p:grpSpPr>
-            <a:xfrm>
-              <a:off x="2410917" y="4161965"/>
-              <a:ext cx="2044149" cy="183226"/>
-              <a:chOff x="2412627" y="4790401"/>
-              <a:chExt cx="2044149" cy="183226"/>
-            </a:xfrm>
-          </p:grpSpPr>
-          <p:sp>
-            <p:nvSpPr>
-              <p:cNvPr id="141" name="TextBox 140"/>
-              <p:cNvSpPr txBox="1"/>
-              <p:nvPr/>
-            </p:nvSpPr>
-            <p:spPr>
-              <a:xfrm>
-                <a:off x="3086592" y="4790401"/>
-                <a:ext cx="807659" cy="183226"/>
-              </a:xfrm>
-              <a:prstGeom prst="rect">
-                <a:avLst/>
-              </a:prstGeom>
-              <a:solidFill>
-                <a:schemeClr val="bg1"/>
-              </a:solidFill>
-            </p:spPr>
-            <p:txBody>
-              <a:bodyPr wrap="square" lIns="45720" tIns="0" rIns="45720" bIns="0" rtlCol="0">
-                <a:noAutofit/>
-              </a:bodyPr>
-              <a:lstStyle/>
-              <a:p>
-                <a:r>
-                  <a:rPr lang="en-US" sz="800"/>
-                  <a:t>CONNECT_RSP</a:t>
-                </a:r>
-              </a:p>
-            </p:txBody>
-          </p:sp>
-          <p:cxnSp>
-            <p:nvCxnSpPr>
-              <p:cNvPr id="142" name="Straight Arrow Connector 141"/>
-              <p:cNvCxnSpPr/>
-              <p:nvPr/>
-            </p:nvCxnSpPr>
-            <p:spPr>
-              <a:xfrm flipV="1">
-                <a:off x="3822156" y="4854668"/>
-                <a:ext cx="634620" cy="1"/>
-              </a:xfrm>
-              <a:prstGeom prst="straightConnector1">
-                <a:avLst/>
-              </a:prstGeom>
-              <a:ln>
-                <a:headEnd type="none" w="sm" len="sm"/>
-                <a:tailEnd type="triangle" w="sm" len="sm"/>
-              </a:ln>
-            </p:spPr>
-            <p:style>
-              <a:lnRef idx="1">
-                <a:schemeClr val="accent1"/>
-              </a:lnRef>
-              <a:fillRef idx="0">
-                <a:schemeClr val="accent1"/>
-              </a:fillRef>
-              <a:effectRef idx="0">
-                <a:schemeClr val="accent1"/>
-              </a:effectRef>
-              <a:fontRef idx="minor">
-                <a:schemeClr val="tx1"/>
-              </a:fontRef>
-            </p:style>
-          </p:cxnSp>
-          <p:cxnSp>
-            <p:nvCxnSpPr>
-              <p:cNvPr id="143" name="Straight Arrow Connector 142"/>
-              <p:cNvCxnSpPr/>
-              <p:nvPr/>
-            </p:nvCxnSpPr>
-            <p:spPr>
-              <a:xfrm flipV="1">
-                <a:off x="2412627" y="4851312"/>
-                <a:ext cx="634620" cy="1"/>
-              </a:xfrm>
-              <a:prstGeom prst="straightConnector1">
-                <a:avLst/>
-              </a:prstGeom>
-              <a:ln>
-                <a:headEnd type="none" w="sm" len="sm"/>
-                <a:tailEnd type="triangle" w="sm" len="sm"/>
               </a:ln>
             </p:spPr>
             <p:style>
@@ -10705,6 +10557,7 @@
           <p:nvCxnSpPr>
             <p:cNvPr id="147" name="Straight Arrow Connector 146"/>
             <p:cNvCxnSpPr>
+              <a:cxnSpLocks/>
               <a:stCxn id="75" idx="2"/>
             </p:cNvCxnSpPr>
             <p:nvPr/>
@@ -10856,6 +10709,7 @@
           <p:nvCxnSpPr>
             <p:cNvPr id="187" name="Straight Arrow Connector 186"/>
             <p:cNvCxnSpPr>
+              <a:cxnSpLocks/>
               <a:stCxn id="113" idx="2"/>
               <a:endCxn id="29" idx="0"/>
             </p:cNvCxnSpPr>
@@ -11131,6 +10985,7 @@
           <p:nvCxnSpPr>
             <p:cNvPr id="188" name="Straight Arrow Connector 187"/>
             <p:cNvCxnSpPr>
+              <a:cxnSpLocks/>
               <a:stCxn id="116" idx="2"/>
               <a:endCxn id="29" idx="0"/>
             </p:cNvCxnSpPr>
@@ -11621,6 +11476,7 @@
           <p:nvCxnSpPr>
             <p:cNvPr id="192" name="Straight Arrow Connector 191"/>
             <p:cNvCxnSpPr>
+              <a:cxnSpLocks/>
               <a:stCxn id="173" idx="3"/>
               <a:endCxn id="189" idx="1"/>
             </p:cNvCxnSpPr>

</xml_diff>

<commit_message>
Updates to mesh material after WA class and updates to remainder of chapters for ModusToolbox 1.1
</commit_message>
<xml_diff>
--- a/labmanual/Drawings/bleintro.pptx
+++ b/labmanual/Drawings/bleintro.pptx
@@ -200,7 +200,7 @@
           <a:p>
             <a:fld id="{5C78E9C7-9CA3-A64A-B46C-6E620848F682}" type="datetimeFigureOut">
               <a:rPr lang="en-US" smtClean="0"/>
-              <a:t>9/8/2018</a:t>
+              <a:t>5/8/2019</a:t>
             </a:fld>
             <a:endParaRPr lang="en-US"/>
           </a:p>
@@ -598,7 +598,7 @@
           <a:p>
             <a:fld id="{FB5F2AB9-D88E-BD44-B295-056A7213B648}" type="datetimeFigureOut">
               <a:rPr lang="en-US" smtClean="0"/>
-              <a:t>9/8/2018</a:t>
+              <a:t>5/8/2019</a:t>
             </a:fld>
             <a:endParaRPr lang="en-US"/>
           </a:p>
@@ -763,7 +763,7 @@
           <a:p>
             <a:fld id="{FB5F2AB9-D88E-BD44-B295-056A7213B648}" type="datetimeFigureOut">
               <a:rPr lang="en-US" smtClean="0"/>
-              <a:t>9/8/2018</a:t>
+              <a:t>5/8/2019</a:t>
             </a:fld>
             <a:endParaRPr lang="en-US"/>
           </a:p>
@@ -938,7 +938,7 @@
           <a:p>
             <a:fld id="{FB5F2AB9-D88E-BD44-B295-056A7213B648}" type="datetimeFigureOut">
               <a:rPr lang="en-US" smtClean="0"/>
-              <a:t>9/8/2018</a:t>
+              <a:t>5/8/2019</a:t>
             </a:fld>
             <a:endParaRPr lang="en-US"/>
           </a:p>
@@ -1103,7 +1103,7 @@
           <a:p>
             <a:fld id="{FB5F2AB9-D88E-BD44-B295-056A7213B648}" type="datetimeFigureOut">
               <a:rPr lang="en-US" smtClean="0"/>
-              <a:t>9/8/2018</a:t>
+              <a:t>5/8/2019</a:t>
             </a:fld>
             <a:endParaRPr lang="en-US"/>
           </a:p>
@@ -1342,7 +1342,7 @@
           <a:p>
             <a:fld id="{FB5F2AB9-D88E-BD44-B295-056A7213B648}" type="datetimeFigureOut">
               <a:rPr lang="en-US" smtClean="0"/>
-              <a:t>9/8/2018</a:t>
+              <a:t>5/8/2019</a:t>
             </a:fld>
             <a:endParaRPr lang="en-US"/>
           </a:p>
@@ -1569,7 +1569,7 @@
           <a:p>
             <a:fld id="{FB5F2AB9-D88E-BD44-B295-056A7213B648}" type="datetimeFigureOut">
               <a:rPr lang="en-US" smtClean="0"/>
-              <a:t>9/8/2018</a:t>
+              <a:t>5/8/2019</a:t>
             </a:fld>
             <a:endParaRPr lang="en-US"/>
           </a:p>
@@ -1931,7 +1931,7 @@
           <a:p>
             <a:fld id="{FB5F2AB9-D88E-BD44-B295-056A7213B648}" type="datetimeFigureOut">
               <a:rPr lang="en-US" smtClean="0"/>
-              <a:t>9/8/2018</a:t>
+              <a:t>5/8/2019</a:t>
             </a:fld>
             <a:endParaRPr lang="en-US"/>
           </a:p>
@@ -2044,7 +2044,7 @@
           <a:p>
             <a:fld id="{FB5F2AB9-D88E-BD44-B295-056A7213B648}" type="datetimeFigureOut">
               <a:rPr lang="en-US" smtClean="0"/>
-              <a:t>9/8/2018</a:t>
+              <a:t>5/8/2019</a:t>
             </a:fld>
             <a:endParaRPr lang="en-US"/>
           </a:p>
@@ -2134,7 +2134,7 @@
           <a:p>
             <a:fld id="{FB5F2AB9-D88E-BD44-B295-056A7213B648}" type="datetimeFigureOut">
               <a:rPr lang="en-US" smtClean="0"/>
-              <a:t>9/8/2018</a:t>
+              <a:t>5/8/2019</a:t>
             </a:fld>
             <a:endParaRPr lang="en-US"/>
           </a:p>
@@ -2406,7 +2406,7 @@
           <a:p>
             <a:fld id="{FB5F2AB9-D88E-BD44-B295-056A7213B648}" type="datetimeFigureOut">
               <a:rPr lang="en-US" smtClean="0"/>
-              <a:t>9/8/2018</a:t>
+              <a:t>5/8/2019</a:t>
             </a:fld>
             <a:endParaRPr lang="en-US"/>
           </a:p>
@@ -2657,7 +2657,7 @@
           <a:p>
             <a:fld id="{FB5F2AB9-D88E-BD44-B295-056A7213B648}" type="datetimeFigureOut">
               <a:rPr lang="en-US" smtClean="0"/>
-              <a:t>9/8/2018</a:t>
+              <a:t>5/8/2019</a:t>
             </a:fld>
             <a:endParaRPr lang="en-US"/>
           </a:p>
@@ -2865,7 +2865,7 @@
           <a:p>
             <a:fld id="{FB5F2AB9-D88E-BD44-B295-056A7213B648}" type="datetimeFigureOut">
               <a:rPr lang="en-US" smtClean="0"/>
-              <a:t>9/8/2018</a:t>
+              <a:t>5/8/2019</a:t>
             </a:fld>
             <a:endParaRPr lang="en-US"/>
           </a:p>
@@ -6992,7 +6992,7 @@
         </p:nvGrpSpPr>
         <p:grpSpPr>
           <a:xfrm>
-            <a:off x="45275" y="152774"/>
+            <a:off x="69487" y="152774"/>
             <a:ext cx="6835630" cy="8778606"/>
             <a:chOff x="45275" y="152774"/>
             <a:chExt cx="6835630" cy="8778606"/>
@@ -10871,12 +10871,14 @@
         <p:cxnSp>
           <p:nvCxnSpPr>
             <p:cNvPr id="169" name="Straight Arrow Connector 168"/>
-            <p:cNvCxnSpPr/>
+            <p:cNvCxnSpPr>
+              <a:cxnSpLocks/>
+            </p:cNvCxnSpPr>
             <p:nvPr/>
           </p:nvCxnSpPr>
           <p:spPr>
             <a:xfrm>
-              <a:off x="3017376" y="6475417"/>
+              <a:off x="2893538" y="6475417"/>
               <a:ext cx="375555" cy="1"/>
             </a:xfrm>
             <a:prstGeom prst="straightConnector1">
@@ -11251,8 +11253,8 @@
           </p:nvSpPr>
           <p:spPr>
             <a:xfrm>
-              <a:off x="3395208" y="6871707"/>
-              <a:ext cx="807659" cy="183226"/>
+              <a:off x="3257081" y="6806235"/>
+              <a:ext cx="1058175" cy="196305"/>
             </a:xfrm>
             <a:prstGeom prst="rect">
               <a:avLst/>
@@ -11268,8 +11270,14 @@
             <a:lstStyle/>
             <a:p>
               <a:r>
-                <a:rPr lang="en-US" sz="800"/>
-                <a:t>WRITE_REQ</a:t>
+                <a:rPr lang="en-US" sz="800" dirty="0"/>
+                <a:t>WRITE_CMD (no resp)</a:t>
+              </a:r>
+            </a:p>
+            <a:p>
+              <a:r>
+                <a:rPr lang="en-US" sz="800" dirty="0"/>
+                <a:t>WRITE_REQ (resp)</a:t>
               </a:r>
             </a:p>
           </p:txBody>
@@ -11311,12 +11319,14 @@
         <p:cxnSp>
           <p:nvCxnSpPr>
             <p:cNvPr id="185" name="Straight Arrow Connector 184"/>
-            <p:cNvCxnSpPr/>
+            <p:cNvCxnSpPr>
+              <a:cxnSpLocks/>
+            </p:cNvCxnSpPr>
             <p:nvPr/>
           </p:nvCxnSpPr>
           <p:spPr>
             <a:xfrm>
-              <a:off x="3021096" y="6932618"/>
+              <a:off x="2863917" y="6932618"/>
               <a:ext cx="375555" cy="1"/>
             </a:xfrm>
             <a:prstGeom prst="straightConnector1">

</xml_diff>